<commit_message>
Adds undo and redo implementation
</commit_message>
<xml_diff>
--- a/docs/images/UndoAndRedo/UndoAndRedoImplementation.pptx
+++ b/docs/images/UndoAndRedo/UndoAndRedoImplementation.pptx
@@ -110,6 +110,11 @@
       </a:defRPr>
     </a:lvl9pPr>
   </p:defaultTextStyle>
+  <p:extLst>
+    <p:ext uri="{EFAFB233-063F-42B5-8137-9DF3F51BA10A}">
+      <p15:sldGuideLst xmlns:p15="http://schemas.microsoft.com/office/powerpoint/2012/main"/>
+    </p:ext>
+  </p:extLst>
 </p:presentation>
 </file>
 
@@ -3669,7 +3674,7 @@
         </p:nvSpPr>
         <p:spPr>
           <a:xfrm>
-            <a:off x="6871939" y="5917673"/>
+            <a:off x="6871939" y="5978030"/>
             <a:ext cx="1157240" cy="369332"/>
           </a:xfrm>
           <a:prstGeom prst="rect">
@@ -3969,8 +3974,8 @@
         </p:nvSpPr>
         <p:spPr>
           <a:xfrm>
-            <a:off x="3972040" y="5511074"/>
-            <a:ext cx="1707127" cy="316727"/>
+            <a:off x="3972040" y="5518694"/>
+            <a:ext cx="1717446" cy="316727"/>
           </a:xfrm>
           <a:prstGeom prst="rect">
             <a:avLst/>
@@ -4401,7 +4406,7 @@
         </p:nvSpPr>
         <p:spPr>
           <a:xfrm>
-            <a:off x="3972040" y="5511074"/>
+            <a:off x="3972040" y="5522504"/>
             <a:ext cx="1707127" cy="316727"/>
           </a:xfrm>
           <a:prstGeom prst="rect">
@@ -4524,7 +4529,7 @@
         </p:nvSpPr>
         <p:spPr>
           <a:xfrm>
-            <a:off x="3972039" y="5194347"/>
+            <a:off x="3972039" y="5205777"/>
             <a:ext cx="1707127" cy="316727"/>
           </a:xfrm>
           <a:prstGeom prst="rect">

</xml_diff>

<commit_message>
Update the size of the image
</commit_message>
<xml_diff>
--- a/docs/images/UndoAndRedo/UndoAndRedoImplementation.pptx
+++ b/docs/images/UndoAndRedo/UndoAndRedoImplementation.pptx
@@ -267,7 +267,7 @@
           <a:p>
             <a:fld id="{856F11DA-9A3A-4A86-BE9C-A62BF20F1BAD}" type="datetimeFigureOut">
               <a:rPr lang="en-SG" smtClean="0"/>
-              <a:t>21/10/2019</a:t>
+              <a:t>22/10/2019</a:t>
             </a:fld>
             <a:endParaRPr lang="en-SG"/>
           </a:p>
@@ -467,7 +467,7 @@
           <a:p>
             <a:fld id="{856F11DA-9A3A-4A86-BE9C-A62BF20F1BAD}" type="datetimeFigureOut">
               <a:rPr lang="en-SG" smtClean="0"/>
-              <a:t>21/10/2019</a:t>
+              <a:t>22/10/2019</a:t>
             </a:fld>
             <a:endParaRPr lang="en-SG"/>
           </a:p>
@@ -677,7 +677,7 @@
           <a:p>
             <a:fld id="{856F11DA-9A3A-4A86-BE9C-A62BF20F1BAD}" type="datetimeFigureOut">
               <a:rPr lang="en-SG" smtClean="0"/>
-              <a:t>21/10/2019</a:t>
+              <a:t>22/10/2019</a:t>
             </a:fld>
             <a:endParaRPr lang="en-SG"/>
           </a:p>
@@ -877,7 +877,7 @@
           <a:p>
             <a:fld id="{856F11DA-9A3A-4A86-BE9C-A62BF20F1BAD}" type="datetimeFigureOut">
               <a:rPr lang="en-SG" smtClean="0"/>
-              <a:t>21/10/2019</a:t>
+              <a:t>22/10/2019</a:t>
             </a:fld>
             <a:endParaRPr lang="en-SG"/>
           </a:p>
@@ -1153,7 +1153,7 @@
           <a:p>
             <a:fld id="{856F11DA-9A3A-4A86-BE9C-A62BF20F1BAD}" type="datetimeFigureOut">
               <a:rPr lang="en-SG" smtClean="0"/>
-              <a:t>21/10/2019</a:t>
+              <a:t>22/10/2019</a:t>
             </a:fld>
             <a:endParaRPr lang="en-SG"/>
           </a:p>
@@ -1421,7 +1421,7 @@
           <a:p>
             <a:fld id="{856F11DA-9A3A-4A86-BE9C-A62BF20F1BAD}" type="datetimeFigureOut">
               <a:rPr lang="en-SG" smtClean="0"/>
-              <a:t>21/10/2019</a:t>
+              <a:t>22/10/2019</a:t>
             </a:fld>
             <a:endParaRPr lang="en-SG"/>
           </a:p>
@@ -1836,7 +1836,7 @@
           <a:p>
             <a:fld id="{856F11DA-9A3A-4A86-BE9C-A62BF20F1BAD}" type="datetimeFigureOut">
               <a:rPr lang="en-SG" smtClean="0"/>
-              <a:t>21/10/2019</a:t>
+              <a:t>22/10/2019</a:t>
             </a:fld>
             <a:endParaRPr lang="en-SG"/>
           </a:p>
@@ -1978,7 +1978,7 @@
           <a:p>
             <a:fld id="{856F11DA-9A3A-4A86-BE9C-A62BF20F1BAD}" type="datetimeFigureOut">
               <a:rPr lang="en-SG" smtClean="0"/>
-              <a:t>21/10/2019</a:t>
+              <a:t>22/10/2019</a:t>
             </a:fld>
             <a:endParaRPr lang="en-SG"/>
           </a:p>
@@ -2091,7 +2091,7 @@
           <a:p>
             <a:fld id="{856F11DA-9A3A-4A86-BE9C-A62BF20F1BAD}" type="datetimeFigureOut">
               <a:rPr lang="en-SG" smtClean="0"/>
-              <a:t>21/10/2019</a:t>
+              <a:t>22/10/2019</a:t>
             </a:fld>
             <a:endParaRPr lang="en-SG"/>
           </a:p>
@@ -2404,7 +2404,7 @@
           <a:p>
             <a:fld id="{856F11DA-9A3A-4A86-BE9C-A62BF20F1BAD}" type="datetimeFigureOut">
               <a:rPr lang="en-SG" smtClean="0"/>
-              <a:t>21/10/2019</a:t>
+              <a:t>22/10/2019</a:t>
             </a:fld>
             <a:endParaRPr lang="en-SG"/>
           </a:p>
@@ -2693,7 +2693,7 @@
           <a:p>
             <a:fld id="{856F11DA-9A3A-4A86-BE9C-A62BF20F1BAD}" type="datetimeFigureOut">
               <a:rPr lang="en-SG" smtClean="0"/>
-              <a:t>21/10/2019</a:t>
+              <a:t>22/10/2019</a:t>
             </a:fld>
             <a:endParaRPr lang="en-SG"/>
           </a:p>
@@ -2936,7 +2936,7 @@
           <a:p>
             <a:fld id="{856F11DA-9A3A-4A86-BE9C-A62BF20F1BAD}" type="datetimeFigureOut">
               <a:rPr lang="en-SG" smtClean="0"/>
-              <a:t>21/10/2019</a:t>
+              <a:t>22/10/2019</a:t>
             </a:fld>
             <a:endParaRPr lang="en-SG"/>
           </a:p>
@@ -4106,7 +4106,7 @@
         </p:nvSpPr>
         <p:spPr>
           <a:xfrm>
-            <a:off x="6871939" y="5917673"/>
+            <a:off x="6871939" y="5978030"/>
             <a:ext cx="1157240" cy="369332"/>
           </a:xfrm>
           <a:prstGeom prst="rect">
@@ -4493,7 +4493,7 @@
         </p:nvSpPr>
         <p:spPr>
           <a:xfrm>
-            <a:off x="6871939" y="5917673"/>
+            <a:off x="6871939" y="5978030"/>
             <a:ext cx="1157240" cy="369332"/>
           </a:xfrm>
           <a:prstGeom prst="rect">
@@ -4976,7 +4976,7 @@
         </p:nvSpPr>
         <p:spPr>
           <a:xfrm>
-            <a:off x="6871939" y="5917673"/>
+            <a:off x="6870865" y="5978030"/>
             <a:ext cx="1157240" cy="369332"/>
           </a:xfrm>
           <a:prstGeom prst="rect">
@@ -5507,7 +5507,7 @@
         </p:nvSpPr>
         <p:spPr>
           <a:xfrm>
-            <a:off x="6871939" y="5917673"/>
+            <a:off x="6870865" y="5978030"/>
             <a:ext cx="1157240" cy="369332"/>
           </a:xfrm>
           <a:prstGeom prst="rect">
@@ -6038,7 +6038,7 @@
         </p:nvSpPr>
         <p:spPr>
           <a:xfrm>
-            <a:off x="6871939" y="5917673"/>
+            <a:off x="6870865" y="5978030"/>
             <a:ext cx="1157240" cy="369332"/>
           </a:xfrm>
           <a:prstGeom prst="rect">

</xml_diff>

<commit_message>
Migrate dev ops to DG and update the images based on review
</commit_message>
<xml_diff>
--- a/docs/images/UndoAndRedo/UndoAndRedoImplementation.pptx
+++ b/docs/images/UndoAndRedo/UndoAndRedoImplementation.pptx
@@ -267,7 +267,7 @@
           <a:p>
             <a:fld id="{856F11DA-9A3A-4A86-BE9C-A62BF20F1BAD}" type="datetimeFigureOut">
               <a:rPr lang="en-SG" smtClean="0"/>
-              <a:t>22/10/2019</a:t>
+              <a:t>1/11/2019</a:t>
             </a:fld>
             <a:endParaRPr lang="en-SG"/>
           </a:p>
@@ -467,7 +467,7 @@
           <a:p>
             <a:fld id="{856F11DA-9A3A-4A86-BE9C-A62BF20F1BAD}" type="datetimeFigureOut">
               <a:rPr lang="en-SG" smtClean="0"/>
-              <a:t>22/10/2019</a:t>
+              <a:t>1/11/2019</a:t>
             </a:fld>
             <a:endParaRPr lang="en-SG"/>
           </a:p>
@@ -677,7 +677,7 @@
           <a:p>
             <a:fld id="{856F11DA-9A3A-4A86-BE9C-A62BF20F1BAD}" type="datetimeFigureOut">
               <a:rPr lang="en-SG" smtClean="0"/>
-              <a:t>22/10/2019</a:t>
+              <a:t>1/11/2019</a:t>
             </a:fld>
             <a:endParaRPr lang="en-SG"/>
           </a:p>
@@ -877,7 +877,7 @@
           <a:p>
             <a:fld id="{856F11DA-9A3A-4A86-BE9C-A62BF20F1BAD}" type="datetimeFigureOut">
               <a:rPr lang="en-SG" smtClean="0"/>
-              <a:t>22/10/2019</a:t>
+              <a:t>1/11/2019</a:t>
             </a:fld>
             <a:endParaRPr lang="en-SG"/>
           </a:p>
@@ -1153,7 +1153,7 @@
           <a:p>
             <a:fld id="{856F11DA-9A3A-4A86-BE9C-A62BF20F1BAD}" type="datetimeFigureOut">
               <a:rPr lang="en-SG" smtClean="0"/>
-              <a:t>22/10/2019</a:t>
+              <a:t>1/11/2019</a:t>
             </a:fld>
             <a:endParaRPr lang="en-SG"/>
           </a:p>
@@ -1421,7 +1421,7 @@
           <a:p>
             <a:fld id="{856F11DA-9A3A-4A86-BE9C-A62BF20F1BAD}" type="datetimeFigureOut">
               <a:rPr lang="en-SG" smtClean="0"/>
-              <a:t>22/10/2019</a:t>
+              <a:t>1/11/2019</a:t>
             </a:fld>
             <a:endParaRPr lang="en-SG"/>
           </a:p>
@@ -1836,7 +1836,7 @@
           <a:p>
             <a:fld id="{856F11DA-9A3A-4A86-BE9C-A62BF20F1BAD}" type="datetimeFigureOut">
               <a:rPr lang="en-SG" smtClean="0"/>
-              <a:t>22/10/2019</a:t>
+              <a:t>1/11/2019</a:t>
             </a:fld>
             <a:endParaRPr lang="en-SG"/>
           </a:p>
@@ -1978,7 +1978,7 @@
           <a:p>
             <a:fld id="{856F11DA-9A3A-4A86-BE9C-A62BF20F1BAD}" type="datetimeFigureOut">
               <a:rPr lang="en-SG" smtClean="0"/>
-              <a:t>22/10/2019</a:t>
+              <a:t>1/11/2019</a:t>
             </a:fld>
             <a:endParaRPr lang="en-SG"/>
           </a:p>
@@ -2091,7 +2091,7 @@
           <a:p>
             <a:fld id="{856F11DA-9A3A-4A86-BE9C-A62BF20F1BAD}" type="datetimeFigureOut">
               <a:rPr lang="en-SG" smtClean="0"/>
-              <a:t>22/10/2019</a:t>
+              <a:t>1/11/2019</a:t>
             </a:fld>
             <a:endParaRPr lang="en-SG"/>
           </a:p>
@@ -2404,7 +2404,7 @@
           <a:p>
             <a:fld id="{856F11DA-9A3A-4A86-BE9C-A62BF20F1BAD}" type="datetimeFigureOut">
               <a:rPr lang="en-SG" smtClean="0"/>
-              <a:t>22/10/2019</a:t>
+              <a:t>1/11/2019</a:t>
             </a:fld>
             <a:endParaRPr lang="en-SG"/>
           </a:p>
@@ -2693,7 +2693,7 @@
           <a:p>
             <a:fld id="{856F11DA-9A3A-4A86-BE9C-A62BF20F1BAD}" type="datetimeFigureOut">
               <a:rPr lang="en-SG" smtClean="0"/>
-              <a:t>22/10/2019</a:t>
+              <a:t>1/11/2019</a:t>
             </a:fld>
             <a:endParaRPr lang="en-SG"/>
           </a:p>
@@ -2936,7 +2936,7 @@
           <a:p>
             <a:fld id="{856F11DA-9A3A-4A86-BE9C-A62BF20F1BAD}" type="datetimeFigureOut">
               <a:rPr lang="en-SG" smtClean="0"/>
-              <a:t>22/10/2019</a:t>
+              <a:t>1/11/2019</a:t>
             </a:fld>
             <a:endParaRPr lang="en-SG"/>
           </a:p>
@@ -3974,14 +3974,14 @@
         </p:nvSpPr>
         <p:spPr>
           <a:xfrm>
-            <a:off x="3972040" y="5518694"/>
+            <a:off x="3972040" y="5527572"/>
             <a:ext cx="1717446" cy="316727"/>
           </a:xfrm>
           <a:prstGeom prst="rect">
             <a:avLst/>
           </a:prstGeom>
           <a:solidFill>
-            <a:srgbClr val="FEFECE"/>
+            <a:srgbClr val="3333C4"/>
           </a:solidFill>
         </p:spPr>
         <p:style>
@@ -4004,10 +4004,18 @@
           <a:p>
             <a:pPr algn="ctr"/>
             <a:r>
-              <a:rPr lang="en-US" sz="1200" u="sng" dirty="0"/>
+              <a:rPr lang="en-US" sz="1200" u="sng" dirty="0">
+                <a:solidFill>
+                  <a:schemeClr val="bg1"/>
+                </a:solidFill>
+              </a:rPr>
               <a:t>a:AddExpenseCommand</a:t>
             </a:r>
-            <a:endParaRPr lang="en-SG" sz="1200" u="sng" dirty="0"/>
+            <a:endParaRPr lang="en-SG" sz="1200" u="sng" dirty="0">
+              <a:solidFill>
+                <a:schemeClr val="bg1"/>
+              </a:solidFill>
+            </a:endParaRPr>
           </a:p>
         </p:txBody>
       </p:sp>
@@ -4042,15 +4050,7 @@
             <a:pPr algn="ctr"/>
             <a:r>
               <a:rPr lang="en-US" dirty="0"/>
-              <a:t>After command “</a:t>
-            </a:r>
-            <a:r>
-              <a:rPr lang="en-US" dirty="0" err="1"/>
-              <a:t>add_expense</a:t>
-            </a:r>
-            <a:r>
-              <a:rPr lang="en-US" dirty="0"/>
-              <a:t> n/Laksa v/4”</a:t>
+              <a:t>After command “add_expense n/Laksa v/4”</a:t>
             </a:r>
             <a:endParaRPr lang="en-SG" dirty="0"/>
           </a:p>
@@ -4413,7 +4413,7 @@
             <a:avLst/>
           </a:prstGeom>
           <a:solidFill>
-            <a:srgbClr val="FEFECE"/>
+            <a:srgbClr val="3333C4"/>
           </a:solidFill>
         </p:spPr>
         <p:style>
@@ -4436,10 +4436,18 @@
           <a:p>
             <a:pPr algn="ctr"/>
             <a:r>
-              <a:rPr lang="en-US" sz="1200" u="sng" dirty="0"/>
+              <a:rPr lang="en-US" sz="1200" u="sng" dirty="0">
+                <a:solidFill>
+                  <a:schemeClr val="bg1"/>
+                </a:solidFill>
+              </a:rPr>
               <a:t>a:AddExpenseCommand</a:t>
             </a:r>
-            <a:endParaRPr lang="en-SG" sz="1200" u="sng" dirty="0"/>
+            <a:endParaRPr lang="en-SG" sz="1200" u="sng" dirty="0">
+              <a:solidFill>
+                <a:schemeClr val="bg1"/>
+              </a:solidFill>
+            </a:endParaRPr>
           </a:p>
         </p:txBody>
       </p:sp>
@@ -4536,7 +4544,7 @@
             <a:avLst/>
           </a:prstGeom>
           <a:solidFill>
-            <a:srgbClr val="FEFECE"/>
+            <a:srgbClr val="3333C4"/>
           </a:solidFill>
         </p:spPr>
         <p:style>
@@ -4559,10 +4567,18 @@
           <a:p>
             <a:pPr algn="ctr"/>
             <a:r>
-              <a:rPr lang="en-US" sz="1200" u="sng" dirty="0"/>
+              <a:rPr lang="en-US" sz="1200" u="sng" dirty="0">
+                <a:solidFill>
+                  <a:schemeClr val="bg1"/>
+                </a:solidFill>
+              </a:rPr>
               <a:t>u:UpdateCommand</a:t>
             </a:r>
-            <a:endParaRPr lang="en-SG" sz="1200" u="sng" dirty="0"/>
+            <a:endParaRPr lang="en-SG" sz="1200" u="sng" dirty="0">
+              <a:solidFill>
+                <a:schemeClr val="bg1"/>
+              </a:solidFill>
+            </a:endParaRPr>
           </a:p>
         </p:txBody>
       </p:sp>
@@ -4597,15 +4613,7 @@
             <a:pPr algn="ctr"/>
             <a:r>
               <a:rPr lang="en-US" dirty="0"/>
-              <a:t>After command “update </a:t>
-            </a:r>
-            <a:r>
-              <a:rPr lang="en-US" dirty="0" err="1"/>
-              <a:t>i</a:t>
-            </a:r>
-            <a:r>
-              <a:rPr lang="en-US" dirty="0"/>
-              <a:t>/1 v/3.5”</a:t>
+              <a:t>After command “update i/1 v/3.5”</a:t>
             </a:r>
             <a:endParaRPr lang="en-SG" dirty="0"/>
           </a:p>
@@ -4889,14 +4897,14 @@
         </p:nvSpPr>
         <p:spPr>
           <a:xfrm>
-            <a:off x="3972040" y="5511074"/>
+            <a:off x="3972040" y="5528830"/>
             <a:ext cx="1707127" cy="316727"/>
           </a:xfrm>
           <a:prstGeom prst="rect">
             <a:avLst/>
           </a:prstGeom>
           <a:solidFill>
-            <a:srgbClr val="FEFECE"/>
+            <a:srgbClr val="3333C4"/>
           </a:solidFill>
         </p:spPr>
         <p:style>
@@ -4919,10 +4927,18 @@
           <a:p>
             <a:pPr algn="ctr"/>
             <a:r>
-              <a:rPr lang="en-US" sz="1200" u="sng" dirty="0"/>
+              <a:rPr lang="en-US" sz="1200" u="sng" dirty="0">
+                <a:solidFill>
+                  <a:schemeClr val="bg1"/>
+                </a:solidFill>
+              </a:rPr>
               <a:t>a:AddExpenseCommand</a:t>
             </a:r>
-            <a:endParaRPr lang="en-SG" sz="1200" u="sng" dirty="0"/>
+            <a:endParaRPr lang="en-SG" sz="1200" u="sng" dirty="0">
+              <a:solidFill>
+                <a:schemeClr val="bg1"/>
+              </a:solidFill>
+            </a:endParaRPr>
           </a:p>
         </p:txBody>
       </p:sp>
@@ -5019,7 +5035,7 @@
             <a:avLst/>
           </a:prstGeom>
           <a:solidFill>
-            <a:srgbClr val="FEFECE"/>
+            <a:srgbClr val="3333C4"/>
           </a:solidFill>
         </p:spPr>
         <p:style>
@@ -5042,10 +5058,18 @@
           <a:p>
             <a:pPr algn="ctr"/>
             <a:r>
-              <a:rPr lang="en-US" sz="1200" u="sng" dirty="0"/>
+              <a:rPr lang="en-US" sz="1200" u="sng" dirty="0">
+                <a:solidFill>
+                  <a:schemeClr val="bg1"/>
+                </a:solidFill>
+              </a:rPr>
               <a:t>u:UpdateCommand</a:t>
             </a:r>
-            <a:endParaRPr lang="en-SG" sz="1200" u="sng" dirty="0"/>
+            <a:endParaRPr lang="en-SG" sz="1200" u="sng" dirty="0">
+              <a:solidFill>
+                <a:schemeClr val="bg1"/>
+              </a:solidFill>
+            </a:endParaRPr>
           </a:p>
         </p:txBody>
       </p:sp>
@@ -5427,7 +5451,7 @@
             <a:avLst/>
           </a:prstGeom>
           <a:solidFill>
-            <a:srgbClr val="FEFECE"/>
+            <a:srgbClr val="3333C4"/>
           </a:solidFill>
         </p:spPr>
         <p:style>
@@ -5450,10 +5474,18 @@
           <a:p>
             <a:pPr algn="ctr"/>
             <a:r>
-              <a:rPr lang="en-US" sz="1200" u="sng" dirty="0"/>
+              <a:rPr lang="en-US" sz="1200" u="sng" dirty="0">
+                <a:solidFill>
+                  <a:schemeClr val="bg1"/>
+                </a:solidFill>
+              </a:rPr>
               <a:t>a:AddExpenseCommand</a:t>
             </a:r>
-            <a:endParaRPr lang="en-SG" sz="1200" u="sng" dirty="0"/>
+            <a:endParaRPr lang="en-SG" sz="1200" u="sng" dirty="0">
+              <a:solidFill>
+                <a:schemeClr val="bg1"/>
+              </a:solidFill>
+            </a:endParaRPr>
           </a:p>
         </p:txBody>
       </p:sp>
@@ -5550,7 +5582,7 @@
             <a:avLst/>
           </a:prstGeom>
           <a:solidFill>
-            <a:srgbClr val="FEFECE"/>
+            <a:srgbClr val="3333C4"/>
           </a:solidFill>
         </p:spPr>
         <p:style>
@@ -5573,10 +5605,18 @@
           <a:p>
             <a:pPr algn="ctr"/>
             <a:r>
-              <a:rPr lang="en-US" sz="1200" u="sng" dirty="0"/>
+              <a:rPr lang="en-US" sz="1200" u="sng" dirty="0">
+                <a:solidFill>
+                  <a:schemeClr val="bg1"/>
+                </a:solidFill>
+              </a:rPr>
               <a:t>u:UpdateCommand</a:t>
             </a:r>
-            <a:endParaRPr lang="en-SG" sz="1200" u="sng" dirty="0"/>
+            <a:endParaRPr lang="en-SG" sz="1200" u="sng" dirty="0">
+              <a:solidFill>
+                <a:schemeClr val="bg1"/>
+              </a:solidFill>
+            </a:endParaRPr>
           </a:p>
         </p:txBody>
       </p:sp>
@@ -5958,7 +5998,7 @@
             <a:avLst/>
           </a:prstGeom>
           <a:solidFill>
-            <a:srgbClr val="FEFECE"/>
+            <a:srgbClr val="3333C4"/>
           </a:solidFill>
         </p:spPr>
         <p:style>
@@ -5981,10 +6021,18 @@
           <a:p>
             <a:pPr algn="ctr"/>
             <a:r>
-              <a:rPr lang="en-US" sz="1200" u="sng" dirty="0"/>
+              <a:rPr lang="en-US" sz="1200" u="sng" dirty="0">
+                <a:solidFill>
+                  <a:schemeClr val="bg1"/>
+                </a:solidFill>
+              </a:rPr>
               <a:t>a:AddExpenseCommand</a:t>
             </a:r>
-            <a:endParaRPr lang="en-SG" sz="1200" u="sng" dirty="0"/>
+            <a:endParaRPr lang="en-SG" sz="1200" u="sng" dirty="0">
+              <a:solidFill>
+                <a:schemeClr val="bg1"/>
+              </a:solidFill>
+            </a:endParaRPr>
           </a:p>
         </p:txBody>
       </p:sp>
@@ -6081,7 +6129,7 @@
             <a:avLst/>
           </a:prstGeom>
           <a:solidFill>
-            <a:srgbClr val="FEFECE"/>
+            <a:srgbClr val="3333C4"/>
           </a:solidFill>
         </p:spPr>
         <p:style>
@@ -6104,10 +6152,18 @@
           <a:p>
             <a:pPr algn="ctr"/>
             <a:r>
-              <a:rPr lang="en-US" sz="1200" u="sng" dirty="0"/>
+              <a:rPr lang="en-US" sz="1200" u="sng" dirty="0">
+                <a:solidFill>
+                  <a:schemeClr val="bg1"/>
+                </a:solidFill>
+              </a:rPr>
               <a:t>u:UpdateCommand</a:t>
             </a:r>
-            <a:endParaRPr lang="en-SG" sz="1200" u="sng" dirty="0"/>
+            <a:endParaRPr lang="en-SG" sz="1200" u="sng" dirty="0">
+              <a:solidFill>
+                <a:schemeClr val="bg1"/>
+              </a:solidFill>
+            </a:endParaRPr>
           </a:p>
         </p:txBody>
       </p:sp>
@@ -6489,7 +6545,7 @@
             <a:avLst/>
           </a:prstGeom>
           <a:solidFill>
-            <a:srgbClr val="FEFECE"/>
+            <a:srgbClr val="3333C4"/>
           </a:solidFill>
         </p:spPr>
         <p:style>
@@ -6512,10 +6568,18 @@
           <a:p>
             <a:pPr algn="ctr"/>
             <a:r>
-              <a:rPr lang="en-US" sz="1200" u="sng" dirty="0"/>
+              <a:rPr lang="en-US" sz="1200" u="sng" dirty="0">
+                <a:solidFill>
+                  <a:schemeClr val="bg1"/>
+                </a:solidFill>
+              </a:rPr>
               <a:t>a:AddExpenseCommand</a:t>
             </a:r>
-            <a:endParaRPr lang="en-SG" sz="1200" u="sng" dirty="0"/>
+            <a:endParaRPr lang="en-SG" sz="1200" u="sng" dirty="0">
+              <a:solidFill>
+                <a:schemeClr val="bg1"/>
+              </a:solidFill>
+            </a:endParaRPr>
           </a:p>
         </p:txBody>
       </p:sp>
@@ -6622,15 +6686,7 @@
             <a:pPr algn="ctr"/>
             <a:r>
               <a:rPr lang="en-US" dirty="0"/>
-              <a:t>After command “delete </a:t>
-            </a:r>
-            <a:r>
-              <a:rPr lang="en-US" dirty="0" err="1"/>
-              <a:t>i</a:t>
-            </a:r>
-            <a:r>
-              <a:rPr lang="en-US" dirty="0"/>
-              <a:t>/1”</a:t>
+              <a:t>After command “delete i/1”</a:t>
             </a:r>
             <a:endParaRPr lang="en-SG" dirty="0"/>
           </a:p>
@@ -6723,7 +6779,7 @@
             <a:avLst/>
           </a:prstGeom>
           <a:solidFill>
-            <a:srgbClr val="FEFECE"/>
+            <a:srgbClr val="3333C4"/>
           </a:solidFill>
         </p:spPr>
         <p:style>
@@ -6746,10 +6802,18 @@
           <a:p>
             <a:pPr algn="ctr"/>
             <a:r>
-              <a:rPr lang="en-US" sz="1200" u="sng" dirty="0"/>
+              <a:rPr lang="en-US" sz="1200" u="sng" dirty="0">
+                <a:solidFill>
+                  <a:schemeClr val="bg1"/>
+                </a:solidFill>
+              </a:rPr>
               <a:t>d:DeleteCommand</a:t>
             </a:r>
-            <a:endParaRPr lang="en-SG" sz="1200" u="sng" dirty="0"/>
+            <a:endParaRPr lang="en-SG" sz="1200" u="sng" dirty="0">
+              <a:solidFill>
+                <a:schemeClr val="bg1"/>
+              </a:solidFill>
+            </a:endParaRPr>
           </a:p>
         </p:txBody>
       </p:sp>

</xml_diff>